<commit_message>
Etapes d'une box #2
</commit_message>
<xml_diff>
--- a/Documentation/Architecture Technique/Architechture-Flux.pptx
+++ b/Documentation/Architecture Technique/Architechture-Flux.pptx
@@ -280,7 +280,7 @@
             <a:fld id="{938FC91C-8F72-4FC3-9EE1-E00D3E055101}" type="datetimeFigureOut">
               <a:rPr lang="fr-FR" smtClean="0"/>
               <a:pPr/>
-              <a:t>03/01/2020</a:t>
+              <a:t>11/01/2020</a:t>
             </a:fld>
             <a:endParaRPr lang="fr-FR" dirty="0"/>
           </a:p>
@@ -495,7 +495,7 @@
             <a:fld id="{938FC91C-8F72-4FC3-9EE1-E00D3E055101}" type="datetimeFigureOut">
               <a:rPr lang="fr-FR" smtClean="0"/>
               <a:pPr/>
-              <a:t>03/01/2020</a:t>
+              <a:t>11/01/2020</a:t>
             </a:fld>
             <a:endParaRPr lang="fr-FR" dirty="0"/>
           </a:p>
@@ -675,7 +675,7 @@
             <a:fld id="{938FC91C-8F72-4FC3-9EE1-E00D3E055101}" type="datetimeFigureOut">
               <a:rPr lang="fr-FR" smtClean="0"/>
               <a:pPr/>
-              <a:t>03/01/2020</a:t>
+              <a:t>11/01/2020</a:t>
             </a:fld>
             <a:endParaRPr lang="fr-FR" dirty="0"/>
           </a:p>
@@ -790,7 +790,7 @@
           <a:p>
             <a:fld id="{938FC91C-8F72-4FC3-9EE1-E00D3E055101}" type="datetimeFigureOut">
               <a:rPr lang="fr-FR" smtClean="0"/>
-              <a:t>03/01/2020</a:t>
+              <a:t>11/01/2020</a:t>
             </a:fld>
             <a:endParaRPr lang="fr-FR"/>
           </a:p>
@@ -1043,7 +1043,7 @@
           <a:p>
             <a:fld id="{938FC91C-8F72-4FC3-9EE1-E00D3E055101}" type="datetimeFigureOut">
               <a:rPr lang="fr-FR" smtClean="0"/>
-              <a:t>03/01/2020</a:t>
+              <a:t>11/01/2020</a:t>
             </a:fld>
             <a:endParaRPr lang="fr-FR" dirty="0"/>
           </a:p>
@@ -3491,7 +3491,7 @@
         <p:spPr>
           <a:xfrm>
             <a:off x="8325098" y="1988125"/>
-            <a:ext cx="3594430" cy="923330"/>
+            <a:ext cx="3594430" cy="1477328"/>
           </a:xfrm>
           <a:prstGeom prst="rect">
             <a:avLst/>
@@ -3523,6 +3523,29 @@
               <a:buFont typeface="Arial" panose="020B0604020202020204" pitchFamily="34" charset="0"/>
               <a:buChar char="•"/>
             </a:pPr>
+            <a:r>
+              <a:rPr lang="fr-FR" dirty="0">
+                <a:solidFill>
+                  <a:schemeClr val="bg1"/>
+                </a:solidFill>
+                <a:latin typeface="Abadi Extra Light" panose="020B0204020104020204" pitchFamily="34" charset="0"/>
+              </a:rPr>
+              <a:t>La qualité de l’image peu varier</a:t>
+            </a:r>
+          </a:p>
+          <a:p>
+            <a:pPr marL="285750" indent="-285750">
+              <a:buFont typeface="Arial" panose="020B0604020202020204" pitchFamily="34" charset="0"/>
+              <a:buChar char="•"/>
+            </a:pPr>
+            <a:endParaRPr lang="fr-FR" dirty="0">
+              <a:solidFill>
+                <a:schemeClr val="bg1"/>
+              </a:solidFill>
+              <a:latin typeface="Abadi Extra Light" panose="020B0204020104020204" pitchFamily="34" charset="0"/>
+            </a:endParaRPr>
+          </a:p>
+          <a:p>
             <a:r>
               <a:rPr lang="fr-FR" dirty="0">
                 <a:solidFill>
@@ -5195,7 +5218,7 @@
         <p:spPr>
           <a:xfrm>
             <a:off x="8325098" y="1988125"/>
-            <a:ext cx="3594430" cy="4544291"/>
+            <a:ext cx="3594430" cy="369332"/>
           </a:xfrm>
           <a:prstGeom prst="rect">
             <a:avLst/>
@@ -5208,7 +5231,19 @@
           </a:bodyPr>
           <a:lstStyle/>
           <a:p>
-            <a:endParaRPr lang="fr-FR" dirty="0"/>
+            <a:pPr marL="285750" indent="-285750">
+              <a:buFont typeface="Arial" panose="020B0604020202020204" pitchFamily="34" charset="0"/>
+              <a:buChar char="•"/>
+            </a:pPr>
+            <a:r>
+              <a:rPr lang="fr-FR" dirty="0">
+                <a:solidFill>
+                  <a:schemeClr val="bg1"/>
+                </a:solidFill>
+                <a:latin typeface="Abadi Extra Light" panose="020B0204020104020204" pitchFamily="34" charset="0"/>
+              </a:rPr>
+              <a:t>La qualité de l’image peu varier</a:t>
+            </a:r>
           </a:p>
         </p:txBody>
       </p:sp>
@@ -6699,7 +6734,7 @@
         <p:spPr>
           <a:xfrm>
             <a:off x="8325098" y="1988125"/>
-            <a:ext cx="3594430" cy="4544291"/>
+            <a:ext cx="3594430" cy="923330"/>
           </a:xfrm>
           <a:prstGeom prst="rect">
             <a:avLst/>
@@ -6712,7 +6747,27 @@
           </a:bodyPr>
           <a:lstStyle/>
           <a:p>
-            <a:endParaRPr lang="fr-FR" dirty="0"/>
+            <a:pPr marL="285750" indent="-285750">
+              <a:buFont typeface="Arial" panose="020B0604020202020204" pitchFamily="34" charset="0"/>
+              <a:buChar char="•"/>
+            </a:pPr>
+            <a:r>
+              <a:rPr lang="fr-FR" dirty="0">
+                <a:solidFill>
+                  <a:schemeClr val="bg1"/>
+                </a:solidFill>
+                <a:latin typeface="Abadi Extra Light" panose="020B0204020104020204" pitchFamily="34" charset="0"/>
+              </a:rPr>
+              <a:t>La qualité de l’image est constante sur toute la vidéo</a:t>
+            </a:r>
+          </a:p>
+          <a:p>
+            <a:endParaRPr lang="fr-FR" dirty="0">
+              <a:solidFill>
+                <a:schemeClr val="bg1"/>
+              </a:solidFill>
+              <a:latin typeface="Abadi Extra Light" panose="020B0204020104020204" pitchFamily="34" charset="0"/>
+            </a:endParaRPr>
           </a:p>
         </p:txBody>
       </p:sp>

</xml_diff>